<commit_message>
Update slide deck for Ex1
</commit_message>
<xml_diff>
--- a/01-intro.pptx
+++ b/01-intro.pptx
@@ -284,7 +284,7 @@
               <a:rPr lang="en-US" smtClean="0">
                 <a:latin typeface="Segoe UI" pitchFamily="34" charset="0"/>
               </a:rPr>
-              <a:t>12/20/2018 3:32 PM</a:t>
+              <a:t>12/1/2019 9:34 AM</a:t>
             </a:fld>
             <a:endParaRPr lang="en-US" dirty="0">
               <a:latin typeface="Segoe UI" pitchFamily="34" charset="0"/>
@@ -581,7 +581,7 @@
           <a:p>
             <a:fld id="{D18B56EA-E28F-4F92-9F16-7A6F2501B303}" type="datetime8">
               <a:rPr lang="en-US" smtClean="0"/>
-              <a:t>12/20/2018 3:32 PM</a:t>
+              <a:t>12/1/2019 9:34 AM</a:t>
             </a:fld>
             <a:endParaRPr lang="en-US" dirty="0"/>
           </a:p>
@@ -964,7 +964,7 @@
           <a:p>
             <a:fld id="{D18B56EA-E28F-4F92-9F16-7A6F2501B303}" type="datetime8">
               <a:rPr lang="en-US" smtClean="0"/>
-              <a:t>12/20/2018 3:32 PM</a:t>
+              <a:t>12/1/2019 9:34 AM</a:t>
             </a:fld>
             <a:endParaRPr lang="en-US" dirty="0"/>
           </a:p>
@@ -1145,7 +1145,7 @@
           <a:p>
             <a:fld id="{D18B56EA-E28F-4F92-9F16-7A6F2501B303}" type="datetime8">
               <a:rPr lang="en-US" smtClean="0"/>
-              <a:t>12/20/2018 3:32 PM</a:t>
+              <a:t>12/1/2019 9:34 AM</a:t>
             </a:fld>
             <a:endParaRPr lang="en-US" dirty="0"/>
           </a:p>
@@ -1326,7 +1326,7 @@
           <a:p>
             <a:fld id="{D18B56EA-E28F-4F92-9F16-7A6F2501B303}" type="datetime8">
               <a:rPr lang="en-US" smtClean="0"/>
-              <a:t>12/20/2018 3:32 PM</a:t>
+              <a:t>12/1/2019 9:34 AM</a:t>
             </a:fld>
             <a:endParaRPr lang="en-US" dirty="0"/>
           </a:p>
@@ -1507,7 +1507,7 @@
           <a:p>
             <a:fld id="{D18B56EA-E28F-4F92-9F16-7A6F2501B303}" type="datetime8">
               <a:rPr lang="en-US" smtClean="0"/>
-              <a:t>12/20/2018 3:32 PM</a:t>
+              <a:t>12/1/2019 9:34 AM</a:t>
             </a:fld>
             <a:endParaRPr lang="en-US" dirty="0"/>
           </a:p>
@@ -1688,7 +1688,7 @@
           <a:p>
             <a:fld id="{D18B56EA-E28F-4F92-9F16-7A6F2501B303}" type="datetime8">
               <a:rPr lang="en-US" smtClean="0"/>
-              <a:t>12/20/2018 3:32 PM</a:t>
+              <a:t>12/1/2019 9:34 AM</a:t>
             </a:fld>
             <a:endParaRPr lang="en-US" dirty="0"/>
           </a:p>
@@ -1869,7 +1869,7 @@
           <a:p>
             <a:fld id="{D18B56EA-E28F-4F92-9F16-7A6F2501B303}" type="datetime8">
               <a:rPr lang="en-US" smtClean="0"/>
-              <a:t>12/20/2018 3:32 PM</a:t>
+              <a:t>12/1/2019 9:34 AM</a:t>
             </a:fld>
             <a:endParaRPr lang="en-US" dirty="0"/>
           </a:p>
@@ -16749,7 +16749,7 @@
               </a:lnSpc>
             </a:pPr>
             <a:r>
-              <a:rPr lang="en-US" sz="1250">
+              <a:rPr lang="en-US" sz="1250" dirty="0">
                 <a:gradFill>
                   <a:gsLst>
                     <a:gs pos="96875">
@@ -16762,7 +16762,7 @@
                   <a:lin ang="5400000" scaled="1"/>
                 </a:gradFill>
               </a:rPr>
-              <a:t>Local</a:t>
+              <a:t>Local or Hosted</a:t>
             </a:r>
           </a:p>
         </p:txBody>
@@ -17052,7 +17052,7 @@
               </a:lnSpc>
             </a:pPr>
             <a:r>
-              <a:rPr lang="en-US" sz="1100">
+              <a:rPr lang="en-US" sz="1100" dirty="0">
                 <a:gradFill>
                   <a:gsLst>
                     <a:gs pos="96875">
@@ -17065,7 +17065,7 @@
                   <a:lin ang="5400000" scaled="1"/>
                 </a:gradFill>
               </a:rPr>
-              <a:t>Available on Classic and Client-Side Pages</a:t>
+              <a:t>Available on Classic and Modern Pages</a:t>
             </a:r>
           </a:p>
         </p:txBody>
@@ -17457,7 +17457,39 @@
                   <a:lin ang="5400000" scaled="0"/>
                 </a:gradFill>
               </a:rPr>
-              <a:t> </a:t>
+              <a:t> @</a:t>
+            </a:r>
+            <a:r>
+              <a:rPr lang="en-US" sz="1100" dirty="0" err="1">
+                <a:gradFill>
+                  <a:gsLst>
+                    <a:gs pos="1250">
+                      <a:schemeClr val="tx1"/>
+                    </a:gs>
+                    <a:gs pos="100000">
+                      <a:schemeClr val="tx1"/>
+                    </a:gs>
+                  </a:gsLst>
+                  <a:lin ang="5400000" scaled="0"/>
+                </a:gradFill>
+              </a:rPr>
+              <a:t>microsoft</a:t>
+            </a:r>
+            <a:r>
+              <a:rPr lang="en-US" sz="1100" dirty="0">
+                <a:gradFill>
+                  <a:gsLst>
+                    <a:gs pos="1250">
+                      <a:schemeClr val="tx1"/>
+                    </a:gs>
+                    <a:gs pos="100000">
+                      <a:schemeClr val="tx1"/>
+                    </a:gs>
+                  </a:gsLst>
+                  <a:lin ang="5400000" scaled="0"/>
+                </a:gradFill>
+              </a:rPr>
+              <a:t>/</a:t>
             </a:r>
             <a:r>
               <a:rPr lang="en-US" sz="1100" dirty="0" err="1">
@@ -17696,7 +17728,7 @@
           <a:lstStyle/>
           <a:p>
             <a:r>
-              <a:rPr lang="en-US" sz="1100">
+              <a:rPr lang="en-US" sz="1100" dirty="0">
                 <a:gradFill>
                   <a:gsLst>
                     <a:gs pos="1250">
@@ -17709,7 +17741,7 @@
                   <a:lin ang="5400000" scaled="0"/>
                 </a:gradFill>
               </a:rPr>
-              <a:t>gulp package-solution</a:t>
+              <a:t>gulp bundle --ship</a:t>
             </a:r>
           </a:p>
         </p:txBody>
@@ -17760,9 +17792,12 @@
           </a:lstStyle>
           <a:p>
             <a:r>
-              <a:rPr lang="en-US"/>
-              <a:t>gulp deploy-azure-storage</a:t>
-            </a:r>
+              <a:rPr lang="en-US" dirty="0"/>
+              <a:t>gulp package-solution --ship</a:t>
+            </a:r>
+          </a:p>
+          <a:p>
+            <a:endParaRPr lang="en-US" dirty="0"/>
           </a:p>
         </p:txBody>
       </p:sp>

</xml_diff>